<commit_message>
delated evauat and recom
</commit_message>
<xml_diff>
--- a/assignment2group4.pptx
+++ b/assignment2group4.pptx
@@ -5022,10 +5022,10 @@
         </p:nvGrpSpPr>
         <p:grpSpPr>
           <a:xfrm>
-            <a:off x="1285852" y="1857364"/>
-            <a:ext cx="7045550" cy="3470554"/>
-            <a:chOff x="1402454" y="1857364"/>
-            <a:chExt cx="6929273" cy="3470554"/>
+            <a:off x="1142976" y="2357430"/>
+            <a:ext cx="6616922" cy="2582768"/>
+            <a:chOff x="1824008" y="1857364"/>
+            <a:chExt cx="6507719" cy="2654206"/>
           </a:xfrm>
         </p:grpSpPr>
         <p:sp>
@@ -5328,58 +5328,6 @@
             </a:prstGeom>
             <a:blipFill rotWithShape="0">
               <a:blip r:embed="rId6" cstate="print"/>
-              <a:stretch>
-                <a:fillRect/>
-              </a:stretch>
-            </a:blipFill>
-          </p:spPr>
-          <p:style>
-            <a:lnRef idx="3">
-              <a:schemeClr val="lt1">
-                <a:hueOff val="0"/>
-                <a:satOff val="0"/>
-                <a:lumOff val="0"/>
-                <a:alphaOff val="0"/>
-              </a:schemeClr>
-            </a:lnRef>
-            <a:fillRef idx="1">
-              <a:scrgbClr r="0" g="0" b="0"/>
-            </a:fillRef>
-            <a:effectRef idx="1">
-              <a:schemeClr val="accent1">
-                <a:tint val="50000"/>
-                <a:hueOff val="0"/>
-                <a:satOff val="0"/>
-                <a:lumOff val="0"/>
-                <a:alphaOff val="0"/>
-              </a:schemeClr>
-            </a:effectRef>
-            <a:fontRef idx="minor">
-              <a:schemeClr val="lt1">
-                <a:hueOff val="0"/>
-                <a:satOff val="0"/>
-                <a:lumOff val="0"/>
-                <a:alphaOff val="0"/>
-              </a:schemeClr>
-            </a:fontRef>
-          </p:style>
-        </p:sp>
-        <p:sp>
-          <p:nvSpPr>
-            <p:cNvPr id="18" name="Овал 17"/>
-            <p:cNvSpPr/>
-            <p:nvPr/>
-          </p:nvSpPr>
-          <p:spPr>
-            <a:xfrm>
-              <a:off x="1402454" y="4740377"/>
-              <a:ext cx="649302" cy="587541"/>
-            </a:xfrm>
-            <a:prstGeom prst="ellipse">
-              <a:avLst/>
-            </a:prstGeom>
-            <a:blipFill rotWithShape="0">
-              <a:blip r:embed="rId7" cstate="print"/>
               <a:stretch>
                 <a:fillRect/>
               </a:stretch>
@@ -5800,134 +5748,6 @@
             </a:p>
           </p:txBody>
         </p:sp>
-        <p:sp>
-          <p:nvSpPr>
-            <p:cNvPr id="17" name="Полилиния 16"/>
-            <p:cNvSpPr/>
-            <p:nvPr/>
-          </p:nvSpPr>
-          <p:spPr>
-            <a:xfrm rot="21600000">
-              <a:off x="1936120" y="4815190"/>
-              <a:ext cx="4928896" cy="455041"/>
-            </a:xfrm>
-            <a:custGeom>
-              <a:avLst/>
-              <a:gdLst>
-                <a:gd name="connsiteX0" fmla="*/ 0 w 4928896"/>
-                <a:gd name="connsiteY0" fmla="*/ 0 h 455040"/>
-                <a:gd name="connsiteX1" fmla="*/ 4701376 w 4928896"/>
-                <a:gd name="connsiteY1" fmla="*/ 0 h 455040"/>
-                <a:gd name="connsiteX2" fmla="*/ 4928896 w 4928896"/>
-                <a:gd name="connsiteY2" fmla="*/ 227520 h 455040"/>
-                <a:gd name="connsiteX3" fmla="*/ 4701376 w 4928896"/>
-                <a:gd name="connsiteY3" fmla="*/ 455040 h 455040"/>
-                <a:gd name="connsiteX4" fmla="*/ 0 w 4928896"/>
-                <a:gd name="connsiteY4" fmla="*/ 455040 h 455040"/>
-                <a:gd name="connsiteX5" fmla="*/ 0 w 4928896"/>
-                <a:gd name="connsiteY5" fmla="*/ 0 h 455040"/>
-              </a:gdLst>
-              <a:ahLst/>
-              <a:cxnLst>
-                <a:cxn ang="0">
-                  <a:pos x="connsiteX0" y="connsiteY0"/>
-                </a:cxn>
-                <a:cxn ang="0">
-                  <a:pos x="connsiteX1" y="connsiteY1"/>
-                </a:cxn>
-                <a:cxn ang="0">
-                  <a:pos x="connsiteX2" y="connsiteY2"/>
-                </a:cxn>
-                <a:cxn ang="0">
-                  <a:pos x="connsiteX3" y="connsiteY3"/>
-                </a:cxn>
-                <a:cxn ang="0">
-                  <a:pos x="connsiteX4" y="connsiteY4"/>
-                </a:cxn>
-                <a:cxn ang="0">
-                  <a:pos x="connsiteX5" y="connsiteY5"/>
-                </a:cxn>
-              </a:cxnLst>
-              <a:rect l="l" t="t" r="r" b="b"/>
-              <a:pathLst>
-                <a:path w="4928896" h="455040">
-                  <a:moveTo>
-                    <a:pt x="4928896" y="455039"/>
-                  </a:moveTo>
-                  <a:lnTo>
-                    <a:pt x="227520" y="455039"/>
-                  </a:lnTo>
-                  <a:lnTo>
-                    <a:pt x="0" y="227520"/>
-                  </a:lnTo>
-                  <a:lnTo>
-                    <a:pt x="227520" y="1"/>
-                  </a:lnTo>
-                  <a:lnTo>
-                    <a:pt x="4928896" y="1"/>
-                  </a:lnTo>
-                  <a:lnTo>
-                    <a:pt x="4928896" y="455039"/>
-                  </a:lnTo>
-                  <a:close/>
-                </a:path>
-              </a:pathLst>
-            </a:custGeom>
-          </p:spPr>
-          <p:style>
-            <a:lnRef idx="3">
-              <a:schemeClr val="lt1">
-                <a:hueOff val="0"/>
-                <a:satOff val="0"/>
-                <a:lumOff val="0"/>
-                <a:alphaOff val="0"/>
-              </a:schemeClr>
-            </a:lnRef>
-            <a:fillRef idx="1">
-              <a:schemeClr val="accent1">
-                <a:hueOff val="0"/>
-                <a:satOff val="0"/>
-                <a:lumOff val="0"/>
-                <a:alphaOff val="0"/>
-              </a:schemeClr>
-            </a:fillRef>
-            <a:effectRef idx="1">
-              <a:schemeClr val="accent1">
-                <a:hueOff val="0"/>
-                <a:satOff val="0"/>
-                <a:lumOff val="0"/>
-                <a:alphaOff val="0"/>
-              </a:schemeClr>
-            </a:effectRef>
-            <a:fontRef idx="minor">
-              <a:schemeClr val="lt1"/>
-            </a:fontRef>
-          </p:style>
-          <p:txBody>
-            <a:bodyPr spcFirstLastPara="0" vert="horz" wrap="square" lIns="635405" tIns="64771" rIns="120904" bIns="64770" numCol="1" spcCol="1270" anchor="ctr" anchorCtr="0">
-              <a:noAutofit/>
-            </a:bodyPr>
-            <a:lstStyle/>
-            <a:p>
-              <a:pPr lvl="0" algn="ctr" defTabSz="755650">
-                <a:lnSpc>
-                  <a:spcPct val="90000"/>
-                </a:lnSpc>
-                <a:spcBef>
-                  <a:spcPct val="0"/>
-                </a:spcBef>
-                <a:spcAft>
-                  <a:spcPct val="35000"/>
-                </a:spcAft>
-              </a:pPr>
-              <a:r>
-                <a:rPr lang="en-GB" sz="1700" kern="1200" dirty="0" smtClean="0"/>
-                <a:t>EVALUATION &amp; RECOMMENDATIONS</a:t>
-              </a:r>
-              <a:endParaRPr lang="en-GB" sz="1700" kern="1200" dirty="0"/>
-            </a:p>
-          </p:txBody>
-        </p:sp>
       </p:grpSp>
       <p:pic>
         <p:nvPicPr>
@@ -5938,7 +5758,7 @@
           <p:nvPr/>
         </p:nvPicPr>
         <p:blipFill>
-          <a:blip r:embed="rId8" cstate="print"/>
+          <a:blip r:embed="rId7" cstate="print"/>
           <a:srcRect/>
           <a:stretch>
             <a:fillRect/>
@@ -6078,7 +5898,6 @@
               <a:rPr lang="en-GB" dirty="0" smtClean="0"/>
               <a:t> replacement, like Git</a:t>
             </a:r>
-            <a:endParaRPr lang="en-GB" dirty="0" smtClean="0"/>
           </a:p>
           <a:p>
             <a:endParaRPr lang="en-GB" dirty="0"/>
@@ -6204,22 +6023,13 @@
           <a:p>
             <a:r>
               <a:rPr lang="en-GB" dirty="0" smtClean="0"/>
-              <a:t>End </a:t>
-            </a:r>
+              <a:t>End user (programmer)</a:t>
+            </a:r>
+          </a:p>
+          <a:p>
             <a:r>
               <a:rPr lang="en-GB" dirty="0" smtClean="0"/>
-              <a:t>user (programmer)</a:t>
-            </a:r>
-            <a:endParaRPr lang="en-GB" dirty="0" smtClean="0"/>
-          </a:p>
-          <a:p>
-            <a:r>
-              <a:rPr lang="en-GB" dirty="0" smtClean="0"/>
-              <a:t>Mercurial project </a:t>
-            </a:r>
-            <a:r>
-              <a:rPr lang="en-GB" dirty="0" smtClean="0"/>
-              <a:t>leader (Matt </a:t>
+              <a:t>Mercurial project leader (Matt </a:t>
             </a:r>
             <a:r>
               <a:rPr lang="en-GB" dirty="0" err="1" smtClean="0"/>
@@ -6229,7 +6039,6 @@
               <a:rPr lang="en-GB" dirty="0" smtClean="0"/>
               <a:t>)</a:t>
             </a:r>
-            <a:endParaRPr lang="en-GB" dirty="0" smtClean="0"/>
           </a:p>
           <a:p>
             <a:r>
@@ -6240,11 +6049,7 @@
           <a:p>
             <a:r>
               <a:rPr lang="en-GB" dirty="0" smtClean="0"/>
-              <a:t>Patch/extension </a:t>
-            </a:r>
-            <a:r>
-              <a:rPr lang="en-GB" dirty="0" smtClean="0"/>
-              <a:t>developers</a:t>
+              <a:t>Patch/extension developers</a:t>
             </a:r>
             <a:endParaRPr lang="en-GB" dirty="0"/>
           </a:p>
@@ -6377,14 +6182,12 @@
               <a:rPr lang="en-GB" dirty="0" smtClean="0"/>
               <a:t>Usability</a:t>
             </a:r>
-            <a:endParaRPr lang="en-GB" dirty="0" smtClean="0"/>
           </a:p>
           <a:p>
             <a:r>
               <a:rPr lang="en-GB" dirty="0" smtClean="0"/>
               <a:t>Extensibility</a:t>
             </a:r>
-            <a:endParaRPr lang="en-GB" dirty="0" smtClean="0"/>
           </a:p>
           <a:p>
             <a:r>
@@ -6396,10 +6199,6 @@
             <a:r>
               <a:rPr lang="en-GB" dirty="0" smtClean="0"/>
               <a:t>Reliability</a:t>
-            </a:r>
-            <a:r>
-              <a:rPr lang="en-GB" dirty="0" smtClean="0"/>
-              <a:t/>
             </a:r>
             <a:br>
               <a:rPr lang="en-GB" dirty="0" smtClean="0"/>
@@ -6889,11 +6688,7 @@
           <a:p>
             <a:r>
               <a:rPr lang="en-GB" dirty="0" smtClean="0"/>
-              <a:t>Interactio</a:t>
-            </a:r>
-            <a:r>
-              <a:rPr lang="en-GB" dirty="0" smtClean="0"/>
-              <a:t>n with other repositories via proxy object</a:t>
+              <a:t>Interaction with other repositories via proxy object</a:t>
             </a:r>
           </a:p>
           <a:p>
@@ -7038,11 +6833,7 @@
           <a:p>
             <a:r>
               <a:rPr lang="en-GB" dirty="0" smtClean="0"/>
-              <a:t>Reliability, </a:t>
-            </a:r>
-            <a:r>
-              <a:rPr lang="en-GB" dirty="0" smtClean="0"/>
-              <a:t>Performance</a:t>
+              <a:t>Reliability, Performance</a:t>
             </a:r>
           </a:p>
           <a:p>

</xml_diff>